<commit_message>
Update developer guide: add illustration for ChangeTagColorCommand implementation
</commit_message>
<xml_diff>
--- a/docs/diagrams/ModelComponentClassDiagram.pptx
+++ b/docs/diagrams/ModelComponentClassDiagram.pptx
@@ -208,7 +208,7 @@
           <a:p>
             <a:fld id="{F5CC4B3F-88C1-4FFA-B1B6-F41C21DC6924}" type="datetimeFigureOut">
               <a:rPr lang="en-US" smtClean="0"/>
-              <a:t>9/4/17</a:t>
+              <a:t>10/19/17</a:t>
             </a:fld>
             <a:endParaRPr lang="en-US"/>
           </a:p>
@@ -657,7 +657,7 @@
           <a:p>
             <a:fld id="{78C97017-6FC3-485B-9764-EAC9E56C1D49}" type="datetimeFigureOut">
               <a:rPr lang="en-US" smtClean="0"/>
-              <a:t>9/4/17</a:t>
+              <a:t>10/19/17</a:t>
             </a:fld>
             <a:endParaRPr lang="en-US"/>
           </a:p>
@@ -827,7 +827,7 @@
           <a:p>
             <a:fld id="{78C97017-6FC3-485B-9764-EAC9E56C1D49}" type="datetimeFigureOut">
               <a:rPr lang="en-US" smtClean="0"/>
-              <a:t>9/4/17</a:t>
+              <a:t>10/19/17</a:t>
             </a:fld>
             <a:endParaRPr lang="en-US"/>
           </a:p>
@@ -1007,7 +1007,7 @@
           <a:p>
             <a:fld id="{78C97017-6FC3-485B-9764-EAC9E56C1D49}" type="datetimeFigureOut">
               <a:rPr lang="en-US" smtClean="0"/>
-              <a:t>9/4/17</a:t>
+              <a:t>10/19/17</a:t>
             </a:fld>
             <a:endParaRPr lang="en-US"/>
           </a:p>
@@ -1177,7 +1177,7 @@
           <a:p>
             <a:fld id="{78C97017-6FC3-485B-9764-EAC9E56C1D49}" type="datetimeFigureOut">
               <a:rPr lang="en-US" smtClean="0"/>
-              <a:t>9/4/17</a:t>
+              <a:t>10/19/17</a:t>
             </a:fld>
             <a:endParaRPr lang="en-US"/>
           </a:p>
@@ -1423,7 +1423,7 @@
           <a:p>
             <a:fld id="{78C97017-6FC3-485B-9764-EAC9E56C1D49}" type="datetimeFigureOut">
               <a:rPr lang="en-US" smtClean="0"/>
-              <a:t>9/4/17</a:t>
+              <a:t>10/19/17</a:t>
             </a:fld>
             <a:endParaRPr lang="en-US"/>
           </a:p>
@@ -1711,7 +1711,7 @@
           <a:p>
             <a:fld id="{78C97017-6FC3-485B-9764-EAC9E56C1D49}" type="datetimeFigureOut">
               <a:rPr lang="en-US" smtClean="0"/>
-              <a:t>9/4/17</a:t>
+              <a:t>10/19/17</a:t>
             </a:fld>
             <a:endParaRPr lang="en-US"/>
           </a:p>
@@ -2133,7 +2133,7 @@
           <a:p>
             <a:fld id="{78C97017-6FC3-485B-9764-EAC9E56C1D49}" type="datetimeFigureOut">
               <a:rPr lang="en-US" smtClean="0"/>
-              <a:t>9/4/17</a:t>
+              <a:t>10/19/17</a:t>
             </a:fld>
             <a:endParaRPr lang="en-US"/>
           </a:p>
@@ -2251,7 +2251,7 @@
           <a:p>
             <a:fld id="{78C97017-6FC3-485B-9764-EAC9E56C1D49}" type="datetimeFigureOut">
               <a:rPr lang="en-US" smtClean="0"/>
-              <a:t>9/4/17</a:t>
+              <a:t>10/19/17</a:t>
             </a:fld>
             <a:endParaRPr lang="en-US"/>
           </a:p>
@@ -2346,7 +2346,7 @@
           <a:p>
             <a:fld id="{78C97017-6FC3-485B-9764-EAC9E56C1D49}" type="datetimeFigureOut">
               <a:rPr lang="en-US" smtClean="0"/>
-              <a:t>9/4/17</a:t>
+              <a:t>10/19/17</a:t>
             </a:fld>
             <a:endParaRPr lang="en-US"/>
           </a:p>
@@ -2623,7 +2623,7 @@
           <a:p>
             <a:fld id="{78C97017-6FC3-485B-9764-EAC9E56C1D49}" type="datetimeFigureOut">
               <a:rPr lang="en-US" smtClean="0"/>
-              <a:t>9/4/17</a:t>
+              <a:t>10/19/17</a:t>
             </a:fld>
             <a:endParaRPr lang="en-US"/>
           </a:p>
@@ -2876,7 +2876,7 @@
           <a:p>
             <a:fld id="{78C97017-6FC3-485B-9764-EAC9E56C1D49}" type="datetimeFigureOut">
               <a:rPr lang="en-US" smtClean="0"/>
-              <a:t>9/4/17</a:t>
+              <a:t>10/19/17</a:t>
             </a:fld>
             <a:endParaRPr lang="en-US"/>
           </a:p>
@@ -3089,7 +3089,7 @@
           <a:p>
             <a:fld id="{78C97017-6FC3-485B-9764-EAC9E56C1D49}" type="datetimeFigureOut">
               <a:rPr lang="en-US" smtClean="0"/>
-              <a:t>9/4/17</a:t>
+              <a:t>10/19/17</a:t>
             </a:fld>
             <a:endParaRPr lang="en-US"/>
           </a:p>
@@ -5909,6 +5909,186 @@
               <a:t>1</a:t>
             </a:r>
             <a:endParaRPr lang="en-SG" sz="1100" dirty="0">
+              <a:solidFill>
+                <a:srgbClr val="7030A0"/>
+              </a:solidFill>
+            </a:endParaRPr>
+          </a:p>
+        </p:txBody>
+      </p:sp>
+      <p:sp>
+        <p:nvSpPr>
+          <p:cNvPr id="55" name="Flowchart: Decision 96"/>
+          <p:cNvSpPr/>
+          <p:nvPr/>
+        </p:nvSpPr>
+        <p:spPr>
+          <a:xfrm>
+            <a:off x="5837183" y="1901299"/>
+            <a:ext cx="236048" cy="173380"/>
+          </a:xfrm>
+          <a:prstGeom prst="flowChartDecision">
+            <a:avLst/>
+          </a:prstGeom>
+          <a:solidFill>
+            <a:srgbClr val="7030A0"/>
+          </a:solidFill>
+          <a:ln w="19050">
+            <a:solidFill>
+              <a:srgbClr val="7030A0"/>
+            </a:solidFill>
+          </a:ln>
+          <a:effectLst/>
+        </p:spPr>
+        <p:style>
+          <a:lnRef idx="1">
+            <a:schemeClr val="accent6"/>
+          </a:lnRef>
+          <a:fillRef idx="2">
+            <a:schemeClr val="accent6"/>
+          </a:fillRef>
+          <a:effectRef idx="1">
+            <a:schemeClr val="accent6"/>
+          </a:effectRef>
+          <a:fontRef idx="minor">
+            <a:schemeClr val="dk1"/>
+          </a:fontRef>
+        </p:style>
+        <p:txBody>
+          <a:bodyPr rtlCol="0" anchor="ctr"/>
+          <a:lstStyle/>
+          <a:p>
+            <a:pPr algn="ctr"/>
+            <a:endParaRPr lang="en-US" sz="1050"/>
+          </a:p>
+        </p:txBody>
+      </p:sp>
+      <p:cxnSp>
+        <p:nvCxnSpPr>
+          <p:cNvPr id="74" name="Elbow Connector 73"/>
+          <p:cNvCxnSpPr/>
+          <p:nvPr/>
+        </p:nvCxnSpPr>
+        <p:spPr>
+          <a:xfrm>
+            <a:off x="6052288" y="1987989"/>
+            <a:ext cx="434402" cy="777"/>
+          </a:xfrm>
+          <a:prstGeom prst="bentConnector3">
+            <a:avLst/>
+          </a:prstGeom>
+          <a:ln w="19050">
+            <a:solidFill>
+              <a:srgbClr val="7030A0"/>
+            </a:solidFill>
+            <a:headEnd type="none" w="med" len="med"/>
+            <a:tailEnd type="arrow" w="med" len="med"/>
+          </a:ln>
+          <a:effectLst/>
+        </p:spPr>
+        <p:style>
+          <a:lnRef idx="1">
+            <a:schemeClr val="accent2"/>
+          </a:lnRef>
+          <a:fillRef idx="2">
+            <a:schemeClr val="accent2"/>
+          </a:fillRef>
+          <a:effectRef idx="1">
+            <a:schemeClr val="accent2"/>
+          </a:effectRef>
+          <a:fontRef idx="minor">
+            <a:schemeClr val="dk1"/>
+          </a:fontRef>
+        </p:style>
+      </p:cxnSp>
+      <p:sp>
+        <p:nvSpPr>
+          <p:cNvPr id="82" name="TextBox 81"/>
+          <p:cNvSpPr txBox="1"/>
+          <p:nvPr/>
+        </p:nvSpPr>
+        <p:spPr>
+          <a:xfrm>
+            <a:off x="6249674" y="1816168"/>
+            <a:ext cx="242103" cy="274406"/>
+          </a:xfrm>
+          <a:prstGeom prst="rect">
+            <a:avLst/>
+          </a:prstGeom>
+          <a:noFill/>
+        </p:spPr>
+        <p:txBody>
+          <a:bodyPr wrap="square" lIns="0" tIns="0" rIns="0" bIns="0" rtlCol="0">
+            <a:noAutofit/>
+          </a:bodyPr>
+          <a:lstStyle/>
+          <a:p>
+            <a:pPr algn="ctr"/>
+            <a:r>
+              <a:rPr lang="en-US" sz="1100" dirty="0" smtClean="0">
+                <a:solidFill>
+                  <a:srgbClr val="7030A0"/>
+                </a:solidFill>
+              </a:rPr>
+              <a:t>1</a:t>
+            </a:r>
+            <a:endParaRPr lang="en-SG" sz="1100" dirty="0">
+              <a:solidFill>
+                <a:srgbClr val="7030A0"/>
+              </a:solidFill>
+            </a:endParaRPr>
+          </a:p>
+        </p:txBody>
+      </p:sp>
+      <p:sp>
+        <p:nvSpPr>
+          <p:cNvPr id="87" name="Rectangle 8"/>
+          <p:cNvSpPr/>
+          <p:nvPr/>
+        </p:nvSpPr>
+        <p:spPr>
+          <a:xfrm>
+            <a:off x="6483123" y="1829932"/>
+            <a:ext cx="708186" cy="285783"/>
+          </a:xfrm>
+          <a:prstGeom prst="rect">
+            <a:avLst/>
+          </a:prstGeom>
+          <a:ln w="19050">
+            <a:solidFill>
+              <a:srgbClr val="7030A0"/>
+            </a:solidFill>
+          </a:ln>
+          <a:effectLst/>
+        </p:spPr>
+        <p:style>
+          <a:lnRef idx="1">
+            <a:schemeClr val="accent4"/>
+          </a:lnRef>
+          <a:fillRef idx="2">
+            <a:schemeClr val="accent4"/>
+          </a:fillRef>
+          <a:effectRef idx="1">
+            <a:schemeClr val="accent4"/>
+          </a:effectRef>
+          <a:fontRef idx="minor">
+            <a:schemeClr val="dk1"/>
+          </a:fontRef>
+        </p:style>
+        <p:txBody>
+          <a:bodyPr rtlCol="0" anchor="ctr"/>
+          <a:lstStyle/>
+          <a:p>
+            <a:pPr algn="ctr"/>
+            <a:r>
+              <a:rPr lang="en-US" sz="1050" dirty="0" err="1" smtClean="0">
+                <a:solidFill>
+                  <a:srgbClr val="7030A0"/>
+                </a:solidFill>
+              </a:rPr>
+              <a:t>TagColor</a:t>
+            </a:r>
+            <a:endParaRPr lang="en-SG" sz="1050" dirty="0">
               <a:solidFill>
                 <a:srgbClr val="7030A0"/>
               </a:solidFill>

</xml_diff>

<commit_message>
Update developer guide: add ChangeFontSize implementation
</commit_message>
<xml_diff>
--- a/docs/diagrams/ModelComponentClassDiagram.pptx
+++ b/docs/diagrams/ModelComponentClassDiagram.pptx
@@ -208,7 +208,7 @@
           <a:p>
             <a:fld id="{F5CC4B3F-88C1-4FFA-B1B6-F41C21DC6924}" type="datetimeFigureOut">
               <a:rPr lang="en-US" smtClean="0"/>
-              <a:t>10/19/17</a:t>
+              <a:t>11/2/17</a:t>
             </a:fld>
             <a:endParaRPr lang="en-US"/>
           </a:p>
@@ -657,7 +657,7 @@
           <a:p>
             <a:fld id="{78C97017-6FC3-485B-9764-EAC9E56C1D49}" type="datetimeFigureOut">
               <a:rPr lang="en-US" smtClean="0"/>
-              <a:t>10/19/17</a:t>
+              <a:t>11/2/17</a:t>
             </a:fld>
             <a:endParaRPr lang="en-US"/>
           </a:p>
@@ -827,7 +827,7 @@
           <a:p>
             <a:fld id="{78C97017-6FC3-485B-9764-EAC9E56C1D49}" type="datetimeFigureOut">
               <a:rPr lang="en-US" smtClean="0"/>
-              <a:t>10/19/17</a:t>
+              <a:t>11/2/17</a:t>
             </a:fld>
             <a:endParaRPr lang="en-US"/>
           </a:p>
@@ -1007,7 +1007,7 @@
           <a:p>
             <a:fld id="{78C97017-6FC3-485B-9764-EAC9E56C1D49}" type="datetimeFigureOut">
               <a:rPr lang="en-US" smtClean="0"/>
-              <a:t>10/19/17</a:t>
+              <a:t>11/2/17</a:t>
             </a:fld>
             <a:endParaRPr lang="en-US"/>
           </a:p>
@@ -1177,7 +1177,7 @@
           <a:p>
             <a:fld id="{78C97017-6FC3-485B-9764-EAC9E56C1D49}" type="datetimeFigureOut">
               <a:rPr lang="en-US" smtClean="0"/>
-              <a:t>10/19/17</a:t>
+              <a:t>11/2/17</a:t>
             </a:fld>
             <a:endParaRPr lang="en-US"/>
           </a:p>
@@ -1423,7 +1423,7 @@
           <a:p>
             <a:fld id="{78C97017-6FC3-485B-9764-EAC9E56C1D49}" type="datetimeFigureOut">
               <a:rPr lang="en-US" smtClean="0"/>
-              <a:t>10/19/17</a:t>
+              <a:t>11/2/17</a:t>
             </a:fld>
             <a:endParaRPr lang="en-US"/>
           </a:p>
@@ -1711,7 +1711,7 @@
           <a:p>
             <a:fld id="{78C97017-6FC3-485B-9764-EAC9E56C1D49}" type="datetimeFigureOut">
               <a:rPr lang="en-US" smtClean="0"/>
-              <a:t>10/19/17</a:t>
+              <a:t>11/2/17</a:t>
             </a:fld>
             <a:endParaRPr lang="en-US"/>
           </a:p>
@@ -2133,7 +2133,7 @@
           <a:p>
             <a:fld id="{78C97017-6FC3-485B-9764-EAC9E56C1D49}" type="datetimeFigureOut">
               <a:rPr lang="en-US" smtClean="0"/>
-              <a:t>10/19/17</a:t>
+              <a:t>11/2/17</a:t>
             </a:fld>
             <a:endParaRPr lang="en-US"/>
           </a:p>
@@ -2251,7 +2251,7 @@
           <a:p>
             <a:fld id="{78C97017-6FC3-485B-9764-EAC9E56C1D49}" type="datetimeFigureOut">
               <a:rPr lang="en-US" smtClean="0"/>
-              <a:t>10/19/17</a:t>
+              <a:t>11/2/17</a:t>
             </a:fld>
             <a:endParaRPr lang="en-US"/>
           </a:p>
@@ -2346,7 +2346,7 @@
           <a:p>
             <a:fld id="{78C97017-6FC3-485B-9764-EAC9E56C1D49}" type="datetimeFigureOut">
               <a:rPr lang="en-US" smtClean="0"/>
-              <a:t>10/19/17</a:t>
+              <a:t>11/2/17</a:t>
             </a:fld>
             <a:endParaRPr lang="en-US"/>
           </a:p>
@@ -2623,7 +2623,7 @@
           <a:p>
             <a:fld id="{78C97017-6FC3-485B-9764-EAC9E56C1D49}" type="datetimeFigureOut">
               <a:rPr lang="en-US" smtClean="0"/>
-              <a:t>10/19/17</a:t>
+              <a:t>11/2/17</a:t>
             </a:fld>
             <a:endParaRPr lang="en-US"/>
           </a:p>
@@ -2876,7 +2876,7 @@
           <a:p>
             <a:fld id="{78C97017-6FC3-485B-9764-EAC9E56C1D49}" type="datetimeFigureOut">
               <a:rPr lang="en-US" smtClean="0"/>
-              <a:t>10/19/17</a:t>
+              <a:t>11/2/17</a:t>
             </a:fld>
             <a:endParaRPr lang="en-US"/>
           </a:p>
@@ -3089,7 +3089,7 @@
           <a:p>
             <a:fld id="{78C97017-6FC3-485B-9764-EAC9E56C1D49}" type="datetimeFigureOut">
               <a:rPr lang="en-US" smtClean="0"/>
-              <a:t>10/19/17</a:t>
+              <a:t>11/2/17</a:t>
             </a:fld>
             <a:endParaRPr lang="en-US"/>
           </a:p>
@@ -3472,8 +3472,8 @@
         </p:nvSpPr>
         <p:spPr>
           <a:xfrm>
-            <a:off x="1119865" y="1727200"/>
-            <a:ext cx="7490735" cy="2997200"/>
+            <a:off x="1119865" y="1682162"/>
+            <a:ext cx="7490735" cy="3987800"/>
           </a:xfrm>
           <a:prstGeom prst="roundRect">
             <a:avLst>
@@ -3569,7 +3569,7 @@
           <a:p>
             <a:pPr algn="ctr"/>
             <a:r>
-              <a:rPr lang="en-US" sz="1050" dirty="0" err="1" smtClean="0">
+              <a:rPr lang="en-US" sz="1050" dirty="0" smtClean="0">
                 <a:solidFill>
                   <a:schemeClr val="bg1"/>
                 </a:solidFill>
@@ -3628,7 +3628,7 @@
           <a:p>
             <a:pPr algn="ctr"/>
             <a:r>
-              <a:rPr lang="en-US" sz="1050" dirty="0" err="1" smtClean="0">
+              <a:rPr lang="en-US" sz="1050" dirty="0" smtClean="0">
                 <a:solidFill>
                   <a:schemeClr val="bg1"/>
                 </a:solidFill>
@@ -3699,7 +3699,7 @@
           </a:xfrm>
           <a:prstGeom prst="bentConnector4">
             <a:avLst>
-              <a:gd name="adj1" fmla="val -101829"/>
+              <a:gd name="adj1" fmla="val -352508"/>
               <a:gd name="adj2" fmla="val 99976"/>
             </a:avLst>
           </a:prstGeom>
@@ -4107,7 +4107,7 @@
           <a:p>
             <a:pPr algn="ctr"/>
             <a:r>
-              <a:rPr lang="en-US" sz="1050" dirty="0" err="1" smtClean="0">
+              <a:rPr lang="en-US" sz="1050" dirty="0" smtClean="0">
                 <a:solidFill>
                   <a:srgbClr val="7030A0"/>
                 </a:solidFill>
@@ -4249,7 +4249,7 @@
           <a:p>
             <a:pPr algn="ctr"/>
             <a:r>
-              <a:rPr lang="en-US" sz="1050" dirty="0" err="1" smtClean="0">
+              <a:rPr lang="en-US" sz="1050" dirty="0" smtClean="0">
                 <a:solidFill>
                   <a:srgbClr val="7030A0"/>
                 </a:solidFill>
@@ -4393,7 +4393,7 @@
           <a:p>
             <a:pPr algn="ctr"/>
             <a:r>
-              <a:rPr lang="en-US" sz="1050" dirty="0" err="1" smtClean="0">
+              <a:rPr lang="en-US" sz="1050" dirty="0" smtClean="0">
                 <a:solidFill>
                   <a:srgbClr val="7030A0"/>
                 </a:solidFill>
@@ -4791,7 +4791,7 @@
               </a:rPr>
             </a:br>
             <a:r>
-              <a:rPr lang="en-US" sz="1050" dirty="0" err="1" smtClean="0">
+              <a:rPr lang="en-US" sz="1050" dirty="0" smtClean="0">
                 <a:solidFill>
                   <a:srgbClr val="7030A0"/>
                 </a:solidFill>
@@ -5388,7 +5388,7 @@
               </a:rPr>
             </a:br>
             <a:r>
-              <a:rPr lang="en-US" sz="1050" dirty="0" err="1" smtClean="0">
+              <a:rPr lang="en-US" sz="1050" dirty="0" smtClean="0">
                 <a:solidFill>
                   <a:srgbClr val="7030A0"/>
                 </a:solidFill>
@@ -5450,7 +5450,7 @@
         </p:nvSpPr>
         <p:spPr>
           <a:xfrm>
-            <a:off x="2057401" y="4239491"/>
+            <a:off x="1590876" y="5006734"/>
             <a:ext cx="1066800" cy="346760"/>
           </a:xfrm>
           <a:prstGeom prst="rect">
@@ -5491,7 +5491,7 @@
               <a:t>&lt;&lt;interface&gt;&gt;</a:t>
             </a:r>
             <a:r>
-              <a:rPr lang="en-US" sz="1050">
+              <a:rPr lang="en-US" sz="1050" dirty="0">
                 <a:solidFill>
                   <a:srgbClr val="7030A0"/>
                 </a:solidFill>
@@ -5499,14 +5499,14 @@
               <a:t/>
             </a:r>
             <a:br>
-              <a:rPr lang="en-US" sz="1050">
+              <a:rPr lang="en-US" sz="1050" dirty="0">
                 <a:solidFill>
                   <a:srgbClr val="7030A0"/>
                 </a:solidFill>
               </a:rPr>
             </a:br>
             <a:r>
-              <a:rPr lang="en-US" sz="1050" dirty="0" err="1" smtClean="0">
+              <a:rPr lang="en-US" sz="1050" dirty="0" smtClean="0">
                 <a:solidFill>
                   <a:srgbClr val="7030A0"/>
                 </a:solidFill>
@@ -5524,19 +5524,18 @@
       <p:cxnSp>
         <p:nvCxnSpPr>
           <p:cNvPr id="124" name="Elbow Connector 122"/>
-          <p:cNvCxnSpPr>
-            <a:stCxn id="119" idx="1"/>
-            <a:endCxn id="122" idx="1"/>
-          </p:cNvCxnSpPr>
+          <p:cNvCxnSpPr/>
           <p:nvPr/>
         </p:nvCxnSpPr>
         <p:spPr>
           <a:xfrm rot="16200000" flipH="1">
-            <a:off x="1364475" y="3719944"/>
-            <a:ext cx="831471" cy="554381"/>
-          </a:xfrm>
-          <a:prstGeom prst="bentConnector2">
-            <a:avLst/>
+            <a:off x="1051787" y="4002687"/>
+            <a:ext cx="1379609" cy="595522"/>
+          </a:xfrm>
+          <a:prstGeom prst="bentConnector3">
+            <a:avLst>
+              <a:gd name="adj1" fmla="val 50000"/>
+            </a:avLst>
           </a:prstGeom>
           <a:ln w="19050">
             <a:solidFill>
@@ -6081,7 +6080,7 @@
           <a:p>
             <a:pPr algn="ctr"/>
             <a:r>
-              <a:rPr lang="en-US" sz="1050" dirty="0" err="1" smtClean="0">
+              <a:rPr lang="en-US" sz="1050" dirty="0" smtClean="0">
                 <a:solidFill>
                   <a:srgbClr val="7030A0"/>
                 </a:solidFill>
@@ -6093,6 +6092,707 @@
                 <a:srgbClr val="7030A0"/>
               </a:solidFill>
             </a:endParaRPr>
+          </a:p>
+        </p:txBody>
+      </p:sp>
+      <p:sp>
+        <p:nvSpPr>
+          <p:cNvPr id="73" name="Flowchart: Decision 96"/>
+          <p:cNvSpPr/>
+          <p:nvPr/>
+        </p:nvSpPr>
+        <p:spPr>
+          <a:xfrm>
+            <a:off x="3327565" y="3519463"/>
+            <a:ext cx="236048" cy="173380"/>
+          </a:xfrm>
+          <a:prstGeom prst="flowChartDecision">
+            <a:avLst/>
+          </a:prstGeom>
+          <a:solidFill>
+            <a:srgbClr val="7030A0"/>
+          </a:solidFill>
+          <a:ln w="19050">
+            <a:solidFill>
+              <a:srgbClr val="7030A0"/>
+            </a:solidFill>
+          </a:ln>
+          <a:effectLst/>
+        </p:spPr>
+        <p:style>
+          <a:lnRef idx="1">
+            <a:schemeClr val="accent6"/>
+          </a:lnRef>
+          <a:fillRef idx="2">
+            <a:schemeClr val="accent6"/>
+          </a:fillRef>
+          <a:effectRef idx="1">
+            <a:schemeClr val="accent6"/>
+          </a:effectRef>
+          <a:fontRef idx="minor">
+            <a:schemeClr val="dk1"/>
+          </a:fontRef>
+        </p:style>
+        <p:txBody>
+          <a:bodyPr rtlCol="0" anchor="ctr"/>
+          <a:lstStyle/>
+          <a:p>
+            <a:pPr algn="ctr"/>
+            <a:endParaRPr lang="en-US" sz="1050"/>
+          </a:p>
+        </p:txBody>
+      </p:sp>
+      <p:sp>
+        <p:nvSpPr>
+          <p:cNvPr id="89" name="Rectangle 8"/>
+          <p:cNvSpPr/>
+          <p:nvPr/>
+        </p:nvSpPr>
+        <p:spPr>
+          <a:xfrm>
+            <a:off x="2572190" y="3905761"/>
+            <a:ext cx="1093635" cy="346760"/>
+          </a:xfrm>
+          <a:prstGeom prst="rect">
+            <a:avLst/>
+          </a:prstGeom>
+          <a:solidFill>
+            <a:srgbClr val="7030A0"/>
+          </a:solidFill>
+          <a:ln w="19050">
+            <a:solidFill>
+              <a:srgbClr val="7030A0"/>
+            </a:solidFill>
+          </a:ln>
+          <a:effectLst/>
+        </p:spPr>
+        <p:style>
+          <a:lnRef idx="1">
+            <a:schemeClr val="accent2"/>
+          </a:lnRef>
+          <a:fillRef idx="2">
+            <a:schemeClr val="accent2"/>
+          </a:fillRef>
+          <a:effectRef idx="1">
+            <a:schemeClr val="accent2"/>
+          </a:effectRef>
+          <a:fontRef idx="minor">
+            <a:schemeClr val="dk1"/>
+          </a:fontRef>
+        </p:style>
+        <p:txBody>
+          <a:bodyPr rtlCol="0" anchor="ctr"/>
+          <a:lstStyle/>
+          <a:p>
+            <a:pPr algn="ctr"/>
+            <a:r>
+              <a:rPr lang="en-US" sz="1050" smtClean="0">
+                <a:solidFill>
+                  <a:schemeClr val="bg1"/>
+                </a:solidFill>
+              </a:rPr>
+              <a:t>GuiSettings</a:t>
+            </a:r>
+            <a:endParaRPr lang="en-SG" sz="1050" dirty="0">
+              <a:solidFill>
+                <a:schemeClr val="bg1"/>
+              </a:solidFill>
+            </a:endParaRPr>
+          </a:p>
+        </p:txBody>
+      </p:sp>
+      <p:cxnSp>
+        <p:nvCxnSpPr>
+          <p:cNvPr id="90" name="Elbow Connector 89"/>
+          <p:cNvCxnSpPr/>
+          <p:nvPr/>
+        </p:nvCxnSpPr>
+        <p:spPr>
+          <a:xfrm rot="5400000">
+            <a:off x="3171178" y="3627672"/>
+            <a:ext cx="280273" cy="275906"/>
+          </a:xfrm>
+          <a:prstGeom prst="bentConnector3">
+            <a:avLst>
+              <a:gd name="adj1" fmla="val 50000"/>
+            </a:avLst>
+          </a:prstGeom>
+          <a:ln w="19050">
+            <a:solidFill>
+              <a:srgbClr val="7030A0"/>
+            </a:solidFill>
+            <a:headEnd type="none" w="med" len="med"/>
+            <a:tailEnd type="arrow" w="med" len="med"/>
+          </a:ln>
+          <a:effectLst/>
+        </p:spPr>
+        <p:style>
+          <a:lnRef idx="1">
+            <a:schemeClr val="accent2"/>
+          </a:lnRef>
+          <a:fillRef idx="2">
+            <a:schemeClr val="accent2"/>
+          </a:fillRef>
+          <a:effectRef idx="1">
+            <a:schemeClr val="accent2"/>
+          </a:effectRef>
+          <a:fontRef idx="minor">
+            <a:schemeClr val="dk1"/>
+          </a:fontRef>
+        </p:style>
+      </p:cxnSp>
+      <p:sp>
+        <p:nvSpPr>
+          <p:cNvPr id="91" name="Rectangle 8"/>
+          <p:cNvSpPr/>
+          <p:nvPr/>
+        </p:nvSpPr>
+        <p:spPr>
+          <a:xfrm>
+            <a:off x="4348352" y="3553157"/>
+            <a:ext cx="708186" cy="285783"/>
+          </a:xfrm>
+          <a:prstGeom prst="rect">
+            <a:avLst/>
+          </a:prstGeom>
+          <a:ln w="19050">
+            <a:solidFill>
+              <a:srgbClr val="7030A0"/>
+            </a:solidFill>
+          </a:ln>
+          <a:effectLst/>
+        </p:spPr>
+        <p:style>
+          <a:lnRef idx="1">
+            <a:schemeClr val="accent4"/>
+          </a:lnRef>
+          <a:fillRef idx="2">
+            <a:schemeClr val="accent4"/>
+          </a:fillRef>
+          <a:effectRef idx="1">
+            <a:schemeClr val="accent4"/>
+          </a:effectRef>
+          <a:fontRef idx="minor">
+            <a:schemeClr val="dk1"/>
+          </a:fontRef>
+        </p:style>
+        <p:txBody>
+          <a:bodyPr rtlCol="0" anchor="ctr"/>
+          <a:lstStyle/>
+          <a:p>
+            <a:pPr algn="ctr"/>
+            <a:r>
+              <a:rPr lang="en-US" sz="1050" dirty="0" smtClean="0">
+                <a:solidFill>
+                  <a:srgbClr val="7030A0"/>
+                </a:solidFill>
+              </a:rPr>
+              <a:t>W</a:t>
+            </a:r>
+            <a:r>
+              <a:rPr lang="en-US" sz="1050" dirty="0" smtClean="0">
+                <a:solidFill>
+                  <a:srgbClr val="7030A0"/>
+                </a:solidFill>
+              </a:rPr>
+              <a:t>indow</a:t>
+            </a:r>
+          </a:p>
+          <a:p>
+            <a:pPr algn="ctr"/>
+            <a:r>
+              <a:rPr lang="en-US" sz="1050" dirty="0" smtClean="0">
+                <a:solidFill>
+                  <a:srgbClr val="7030A0"/>
+                </a:solidFill>
+              </a:rPr>
+              <a:t>Width</a:t>
+            </a:r>
+            <a:endParaRPr lang="en-SG" sz="1050" dirty="0">
+              <a:solidFill>
+                <a:srgbClr val="7030A0"/>
+              </a:solidFill>
+            </a:endParaRPr>
+          </a:p>
+        </p:txBody>
+      </p:sp>
+      <p:sp>
+        <p:nvSpPr>
+          <p:cNvPr id="92" name="Flowchart: Decision 96"/>
+          <p:cNvSpPr/>
+          <p:nvPr/>
+        </p:nvSpPr>
+        <p:spPr>
+          <a:xfrm>
+            <a:off x="3677902" y="3932337"/>
+            <a:ext cx="236048" cy="173380"/>
+          </a:xfrm>
+          <a:prstGeom prst="flowChartDecision">
+            <a:avLst/>
+          </a:prstGeom>
+          <a:solidFill>
+            <a:srgbClr val="7030A0"/>
+          </a:solidFill>
+          <a:ln w="19050">
+            <a:solidFill>
+              <a:srgbClr val="7030A0"/>
+            </a:solidFill>
+          </a:ln>
+          <a:effectLst/>
+        </p:spPr>
+        <p:style>
+          <a:lnRef idx="1">
+            <a:schemeClr val="accent6"/>
+          </a:lnRef>
+          <a:fillRef idx="2">
+            <a:schemeClr val="accent6"/>
+          </a:fillRef>
+          <a:effectRef idx="1">
+            <a:schemeClr val="accent6"/>
+          </a:effectRef>
+          <a:fontRef idx="minor">
+            <a:schemeClr val="dk1"/>
+          </a:fontRef>
+        </p:style>
+        <p:txBody>
+          <a:bodyPr rtlCol="0" anchor="ctr"/>
+          <a:lstStyle/>
+          <a:p>
+            <a:pPr algn="ctr"/>
+            <a:endParaRPr lang="en-US" sz="1050"/>
+          </a:p>
+        </p:txBody>
+      </p:sp>
+      <p:cxnSp>
+        <p:nvCxnSpPr>
+          <p:cNvPr id="93" name="Elbow Connector 92"/>
+          <p:cNvCxnSpPr/>
+          <p:nvPr/>
+        </p:nvCxnSpPr>
+        <p:spPr>
+          <a:xfrm flipV="1">
+            <a:off x="3913950" y="3696049"/>
+            <a:ext cx="434402" cy="327761"/>
+          </a:xfrm>
+          <a:prstGeom prst="bentConnector3">
+            <a:avLst/>
+          </a:prstGeom>
+          <a:ln w="19050">
+            <a:solidFill>
+              <a:srgbClr val="7030A0"/>
+            </a:solidFill>
+            <a:headEnd type="none" w="med" len="med"/>
+            <a:tailEnd type="arrow" w="med" len="med"/>
+          </a:ln>
+          <a:effectLst/>
+        </p:spPr>
+        <p:style>
+          <a:lnRef idx="1">
+            <a:schemeClr val="accent2"/>
+          </a:lnRef>
+          <a:fillRef idx="2">
+            <a:schemeClr val="accent2"/>
+          </a:fillRef>
+          <a:effectRef idx="1">
+            <a:schemeClr val="accent2"/>
+          </a:effectRef>
+          <a:fontRef idx="minor">
+            <a:schemeClr val="dk1"/>
+          </a:fontRef>
+        </p:style>
+      </p:cxnSp>
+      <p:sp>
+        <p:nvSpPr>
+          <p:cNvPr id="94" name="Rectangle 8"/>
+          <p:cNvSpPr/>
+          <p:nvPr/>
+        </p:nvSpPr>
+        <p:spPr>
+          <a:xfrm>
+            <a:off x="4348352" y="3876135"/>
+            <a:ext cx="708186" cy="285783"/>
+          </a:xfrm>
+          <a:prstGeom prst="rect">
+            <a:avLst/>
+          </a:prstGeom>
+          <a:ln w="19050">
+            <a:solidFill>
+              <a:srgbClr val="7030A0"/>
+            </a:solidFill>
+          </a:ln>
+          <a:effectLst/>
+        </p:spPr>
+        <p:style>
+          <a:lnRef idx="1">
+            <a:schemeClr val="accent4"/>
+          </a:lnRef>
+          <a:fillRef idx="2">
+            <a:schemeClr val="accent4"/>
+          </a:fillRef>
+          <a:effectRef idx="1">
+            <a:schemeClr val="accent4"/>
+          </a:effectRef>
+          <a:fontRef idx="minor">
+            <a:schemeClr val="dk1"/>
+          </a:fontRef>
+        </p:style>
+        <p:txBody>
+          <a:bodyPr rtlCol="0" anchor="ctr"/>
+          <a:lstStyle/>
+          <a:p>
+            <a:pPr algn="ctr"/>
+            <a:r>
+              <a:rPr lang="en-US" sz="1050" dirty="0" smtClean="0">
+                <a:solidFill>
+                  <a:srgbClr val="7030A0"/>
+                </a:solidFill>
+              </a:rPr>
+              <a:t>Window</a:t>
+            </a:r>
+          </a:p>
+          <a:p>
+            <a:pPr algn="ctr"/>
+            <a:r>
+              <a:rPr lang="en-US" sz="1050" dirty="0" smtClean="0">
+                <a:solidFill>
+                  <a:srgbClr val="7030A0"/>
+                </a:solidFill>
+              </a:rPr>
+              <a:t>Height</a:t>
+            </a:r>
+            <a:endParaRPr lang="en-SG" sz="1050" dirty="0">
+              <a:solidFill>
+                <a:srgbClr val="7030A0"/>
+              </a:solidFill>
+            </a:endParaRPr>
+          </a:p>
+        </p:txBody>
+      </p:sp>
+      <p:cxnSp>
+        <p:nvCxnSpPr>
+          <p:cNvPr id="95" name="Elbow Connector 94"/>
+          <p:cNvCxnSpPr/>
+          <p:nvPr/>
+        </p:nvCxnSpPr>
+        <p:spPr>
+          <a:xfrm flipV="1">
+            <a:off x="3913950" y="4019027"/>
+            <a:ext cx="434402" cy="4783"/>
+          </a:xfrm>
+          <a:prstGeom prst="bentConnector3">
+            <a:avLst/>
+          </a:prstGeom>
+          <a:ln w="19050">
+            <a:solidFill>
+              <a:srgbClr val="7030A0"/>
+            </a:solidFill>
+            <a:headEnd type="none" w="med" len="med"/>
+            <a:tailEnd type="arrow" w="med" len="med"/>
+          </a:ln>
+          <a:effectLst/>
+        </p:spPr>
+        <p:style>
+          <a:lnRef idx="1">
+            <a:schemeClr val="accent2"/>
+          </a:lnRef>
+          <a:fillRef idx="2">
+            <a:schemeClr val="accent2"/>
+          </a:fillRef>
+          <a:effectRef idx="1">
+            <a:schemeClr val="accent2"/>
+          </a:effectRef>
+          <a:fontRef idx="minor">
+            <a:schemeClr val="dk1"/>
+          </a:fontRef>
+        </p:style>
+      </p:cxnSp>
+      <p:sp>
+        <p:nvSpPr>
+          <p:cNvPr id="96" name="Rectangle 8"/>
+          <p:cNvSpPr/>
+          <p:nvPr/>
+        </p:nvSpPr>
+        <p:spPr>
+          <a:xfrm>
+            <a:off x="4348352" y="4199113"/>
+            <a:ext cx="814820" cy="285783"/>
+          </a:xfrm>
+          <a:prstGeom prst="rect">
+            <a:avLst/>
+          </a:prstGeom>
+          <a:ln w="19050">
+            <a:solidFill>
+              <a:srgbClr val="7030A0"/>
+            </a:solidFill>
+          </a:ln>
+          <a:effectLst/>
+        </p:spPr>
+        <p:style>
+          <a:lnRef idx="1">
+            <a:schemeClr val="accent4"/>
+          </a:lnRef>
+          <a:fillRef idx="2">
+            <a:schemeClr val="accent4"/>
+          </a:fillRef>
+          <a:effectRef idx="1">
+            <a:schemeClr val="accent4"/>
+          </a:effectRef>
+          <a:fontRef idx="minor">
+            <a:schemeClr val="dk1"/>
+          </a:fontRef>
+        </p:style>
+        <p:txBody>
+          <a:bodyPr rtlCol="0" anchor="ctr"/>
+          <a:lstStyle/>
+          <a:p>
+            <a:pPr algn="ctr"/>
+            <a:r>
+              <a:rPr lang="en-US" sz="1050" dirty="0" smtClean="0">
+                <a:solidFill>
+                  <a:srgbClr val="7030A0"/>
+                </a:solidFill>
+              </a:rPr>
+              <a:t>Window</a:t>
+            </a:r>
+          </a:p>
+          <a:p>
+            <a:pPr algn="ctr"/>
+            <a:r>
+              <a:rPr lang="en-US" sz="1050" dirty="0" smtClean="0">
+                <a:solidFill>
+                  <a:srgbClr val="7030A0"/>
+                </a:solidFill>
+              </a:rPr>
+              <a:t>Coordinate</a:t>
+            </a:r>
+            <a:endParaRPr lang="en-SG" sz="1050" dirty="0">
+              <a:solidFill>
+                <a:srgbClr val="7030A0"/>
+              </a:solidFill>
+            </a:endParaRPr>
+          </a:p>
+        </p:txBody>
+      </p:sp>
+      <p:cxnSp>
+        <p:nvCxnSpPr>
+          <p:cNvPr id="98" name="Elbow Connector 97"/>
+          <p:cNvCxnSpPr/>
+          <p:nvPr/>
+        </p:nvCxnSpPr>
+        <p:spPr>
+          <a:xfrm>
+            <a:off x="3913950" y="4023810"/>
+            <a:ext cx="434402" cy="318195"/>
+          </a:xfrm>
+          <a:prstGeom prst="bentConnector3">
+            <a:avLst/>
+          </a:prstGeom>
+          <a:ln w="19050">
+            <a:solidFill>
+              <a:srgbClr val="7030A0"/>
+            </a:solidFill>
+            <a:headEnd type="none" w="med" len="med"/>
+            <a:tailEnd type="arrow" w="med" len="med"/>
+          </a:ln>
+          <a:effectLst/>
+        </p:spPr>
+        <p:style>
+          <a:lnRef idx="1">
+            <a:schemeClr val="accent2"/>
+          </a:lnRef>
+          <a:fillRef idx="2">
+            <a:schemeClr val="accent2"/>
+          </a:fillRef>
+          <a:effectRef idx="1">
+            <a:schemeClr val="accent2"/>
+          </a:effectRef>
+          <a:fontRef idx="minor">
+            <a:schemeClr val="dk1"/>
+          </a:fontRef>
+        </p:style>
+      </p:cxnSp>
+      <p:sp>
+        <p:nvSpPr>
+          <p:cNvPr id="101" name="Rectangle 100"/>
+          <p:cNvSpPr/>
+          <p:nvPr/>
+        </p:nvSpPr>
+        <p:spPr>
+          <a:xfrm>
+            <a:off x="4348352" y="4522090"/>
+            <a:ext cx="708186" cy="285783"/>
+          </a:xfrm>
+          <a:prstGeom prst="rect">
+            <a:avLst/>
+          </a:prstGeom>
+          <a:ln w="19050">
+            <a:solidFill>
+              <a:srgbClr val="7030A0"/>
+            </a:solidFill>
+          </a:ln>
+          <a:effectLst/>
+        </p:spPr>
+        <p:style>
+          <a:lnRef idx="1">
+            <a:schemeClr val="accent4"/>
+          </a:lnRef>
+          <a:fillRef idx="2">
+            <a:schemeClr val="accent4"/>
+          </a:fillRef>
+          <a:effectRef idx="1">
+            <a:schemeClr val="accent4"/>
+          </a:effectRef>
+          <a:fontRef idx="minor">
+            <a:schemeClr val="dk1"/>
+          </a:fontRef>
+        </p:style>
+        <p:txBody>
+          <a:bodyPr rtlCol="0" anchor="ctr"/>
+          <a:lstStyle/>
+          <a:p>
+            <a:pPr algn="ctr"/>
+            <a:r>
+              <a:rPr lang="en-US" sz="1050" dirty="0" smtClean="0">
+                <a:solidFill>
+                  <a:srgbClr val="7030A0"/>
+                </a:solidFill>
+              </a:rPr>
+              <a:t>FontSize</a:t>
+            </a:r>
+            <a:endParaRPr lang="en-SG" sz="1050" dirty="0">
+              <a:solidFill>
+                <a:srgbClr val="7030A0"/>
+              </a:solidFill>
+            </a:endParaRPr>
+          </a:p>
+        </p:txBody>
+      </p:sp>
+      <p:cxnSp>
+        <p:nvCxnSpPr>
+          <p:cNvPr id="102" name="Elbow Connector 101"/>
+          <p:cNvCxnSpPr/>
+          <p:nvPr/>
+        </p:nvCxnSpPr>
+        <p:spPr>
+          <a:xfrm>
+            <a:off x="3913950" y="4023810"/>
+            <a:ext cx="434402" cy="641172"/>
+          </a:xfrm>
+          <a:prstGeom prst="bentConnector3">
+            <a:avLst/>
+          </a:prstGeom>
+          <a:ln w="19050">
+            <a:solidFill>
+              <a:srgbClr val="7030A0"/>
+            </a:solidFill>
+            <a:headEnd type="none" w="med" len="med"/>
+            <a:tailEnd type="arrow" w="med" len="med"/>
+          </a:ln>
+          <a:effectLst/>
+        </p:spPr>
+        <p:style>
+          <a:lnRef idx="1">
+            <a:schemeClr val="accent2"/>
+          </a:lnRef>
+          <a:fillRef idx="2">
+            <a:schemeClr val="accent2"/>
+          </a:fillRef>
+          <a:effectRef idx="1">
+            <a:schemeClr val="accent2"/>
+          </a:effectRef>
+          <a:fontRef idx="minor">
+            <a:schemeClr val="dk1"/>
+          </a:fontRef>
+        </p:style>
+      </p:cxnSp>
+      <p:cxnSp>
+        <p:nvCxnSpPr>
+          <p:cNvPr id="103" name="Elbow Connector 102"/>
+          <p:cNvCxnSpPr/>
+          <p:nvPr/>
+        </p:nvCxnSpPr>
+        <p:spPr>
+          <a:xfrm rot="5400000" flipH="1" flipV="1">
+            <a:off x="3838398" y="3685178"/>
+            <a:ext cx="799042" cy="199691"/>
+          </a:xfrm>
+          <a:prstGeom prst="bentConnector3">
+            <a:avLst>
+              <a:gd name="adj1" fmla="val 99793"/>
+            </a:avLst>
+          </a:prstGeom>
+          <a:ln w="19050">
+            <a:solidFill>
+              <a:srgbClr val="7030A0"/>
+            </a:solidFill>
+            <a:headEnd type="none" w="med" len="med"/>
+            <a:tailEnd type="arrow" w="med" len="med"/>
+          </a:ln>
+          <a:effectLst/>
+        </p:spPr>
+        <p:style>
+          <a:lnRef idx="1">
+            <a:schemeClr val="accent2"/>
+          </a:lnRef>
+          <a:fillRef idx="2">
+            <a:schemeClr val="accent2"/>
+          </a:fillRef>
+          <a:effectRef idx="1">
+            <a:schemeClr val="accent2"/>
+          </a:effectRef>
+          <a:fontRef idx="minor">
+            <a:schemeClr val="dk1"/>
+          </a:fontRef>
+        </p:style>
+      </p:cxnSp>
+      <p:sp>
+        <p:nvSpPr>
+          <p:cNvPr id="109" name="Rectangle 8"/>
+          <p:cNvSpPr/>
+          <p:nvPr/>
+        </p:nvSpPr>
+        <p:spPr>
+          <a:xfrm>
+            <a:off x="4346046" y="3230946"/>
+            <a:ext cx="708186" cy="285783"/>
+          </a:xfrm>
+          <a:prstGeom prst="rect">
+            <a:avLst/>
+          </a:prstGeom>
+          <a:ln w="19050">
+            <a:solidFill>
+              <a:srgbClr val="7030A0"/>
+            </a:solidFill>
+          </a:ln>
+          <a:effectLst/>
+        </p:spPr>
+        <p:style>
+          <a:lnRef idx="1">
+            <a:schemeClr val="accent4"/>
+          </a:lnRef>
+          <a:fillRef idx="2">
+            <a:schemeClr val="accent4"/>
+          </a:fillRef>
+          <a:effectRef idx="1">
+            <a:schemeClr val="accent4"/>
+          </a:effectRef>
+          <a:fontRef idx="minor">
+            <a:schemeClr val="dk1"/>
+          </a:fontRef>
+        </p:style>
+        <p:txBody>
+          <a:bodyPr rtlCol="0" anchor="ctr"/>
+          <a:lstStyle/>
+          <a:p>
+            <a:pPr algn="ctr"/>
+            <a:r>
+              <a:rPr lang="en-US" sz="1050" dirty="0" smtClean="0">
+                <a:solidFill>
+                  <a:srgbClr val="7030A0"/>
+                </a:solidFill>
+              </a:rPr>
+              <a:t>Theme</a:t>
+            </a:r>
           </a:p>
         </p:txBody>
       </p:sp>

</xml_diff>